<commit_message>
update cycle-de-vie and rm docs
</commit_message>
<xml_diff>
--- a/docs/assets/docs/schema-cycle-de-vie.pptx
+++ b/docs/assets/docs/schema-cycle-de-vie.pptx
@@ -204,7 +204,7 @@
           <a:p>
             <a:fld id="{FA6837BF-BC66-5242-A4C0-DD83D59D57D3}" type="datetimeFigureOut">
               <a:rPr lang="fr-FR" smtClean="0"/>
-              <a:t>11/07/2024</a:t>
+              <a:t>18/07/2024</a:t>
             </a:fld>
             <a:endParaRPr lang="fr-FR"/>
           </a:p>
@@ -9539,7 +9539,7 @@
         </p:nvSpPr>
         <p:spPr>
           <a:xfrm>
-            <a:off x="1949901" y="1363318"/>
+            <a:off x="2337527" y="1363318"/>
             <a:ext cx="1952001" cy="697623"/>
           </a:xfrm>
           <a:prstGeom prst="rect">
@@ -9604,7 +9604,7 @@
         </p:nvSpPr>
         <p:spPr>
           <a:xfrm>
-            <a:off x="125325" y="1421701"/>
+            <a:off x="512951" y="1421701"/>
             <a:ext cx="1461741" cy="381108"/>
           </a:xfrm>
           <a:prstGeom prst="rect">
@@ -9686,7 +9686,7 @@
         </p:nvCxnSpPr>
         <p:spPr>
           <a:xfrm>
-            <a:off x="2925902" y="2060941"/>
+            <a:off x="3313528" y="2060941"/>
             <a:ext cx="0" cy="439502"/>
           </a:xfrm>
           <a:prstGeom prst="straightConnector1">
@@ -9728,7 +9728,7 @@
         </p:nvSpPr>
         <p:spPr>
           <a:xfrm>
-            <a:off x="1949902" y="2500443"/>
+            <a:off x="2337528" y="2500443"/>
             <a:ext cx="1952000" cy="439490"/>
           </a:xfrm>
           <a:prstGeom prst="rect">
@@ -9797,7 +9797,7 @@
         </p:nvCxnSpPr>
         <p:spPr>
           <a:xfrm>
-            <a:off x="2925902" y="2939933"/>
+            <a:off x="3313528" y="2939933"/>
             <a:ext cx="1" cy="804727"/>
           </a:xfrm>
           <a:prstGeom prst="straightConnector1">
@@ -9839,7 +9839,7 @@
         </p:nvSpPr>
         <p:spPr>
           <a:xfrm>
-            <a:off x="1949902" y="3744660"/>
+            <a:off x="2337528" y="3744660"/>
             <a:ext cx="1952001" cy="439490"/>
           </a:xfrm>
           <a:prstGeom prst="rect">
@@ -9938,7 +9938,7 @@
         </p:nvSpPr>
         <p:spPr>
           <a:xfrm>
-            <a:off x="125326" y="3533540"/>
+            <a:off x="512952" y="3533540"/>
             <a:ext cx="1461741" cy="584511"/>
           </a:xfrm>
           <a:prstGeom prst="rect">
@@ -9983,6 +9983,15 @@
               <a:defRPr/>
             </a:pPr>
             <a:r>
+              <a:rPr lang="fr-FR" sz="1500" dirty="0">
+                <a:solidFill>
+                  <a:prstClr val="black"/>
+                </a:solidFill>
+                <a:latin typeface="Arial"/>
+              </a:rPr>
+              <a:t>trial</a:t>
+            </a:r>
+            <a:r>
               <a:rPr kumimoji="0" lang="fr-FR" sz="1500" b="0" i="0" u="none" strike="noStrike" kern="1200" cap="none" spc="0" normalizeH="0" baseline="0" noProof="0" dirty="0">
                 <a:ln>
                   <a:noFill/>
@@ -9997,7 +10006,7 @@
                 <a:ea typeface="+mn-ea"/>
                 <a:cs typeface="+mn-cs"/>
               </a:rPr>
-              <a:t>For-implementation</a:t>
+              <a:t>-implementation</a:t>
             </a:r>
           </a:p>
         </p:txBody>
@@ -10020,7 +10029,7 @@
         </p:nvCxnSpPr>
         <p:spPr>
           <a:xfrm>
-            <a:off x="3901903" y="3964405"/>
+            <a:off x="4289529" y="3964405"/>
             <a:ext cx="824066" cy="0"/>
           </a:xfrm>
           <a:prstGeom prst="straightConnector1">
@@ -10062,7 +10071,7 @@
         </p:nvSpPr>
         <p:spPr>
           <a:xfrm>
-            <a:off x="4725969" y="3744660"/>
+            <a:off x="5113595" y="3744660"/>
             <a:ext cx="1753537" cy="439490"/>
           </a:xfrm>
           <a:prstGeom prst="rect">
@@ -10127,7 +10136,7 @@
         </p:nvSpPr>
         <p:spPr>
           <a:xfrm>
-            <a:off x="83195" y="2397655"/>
+            <a:off x="470821" y="2397655"/>
             <a:ext cx="1503872" cy="584510"/>
           </a:xfrm>
           <a:prstGeom prst="rect">
@@ -10205,7 +10214,7 @@
         </p:nvSpPr>
         <p:spPr>
           <a:xfrm>
-            <a:off x="8080744" y="6127268"/>
+            <a:off x="8468370" y="6127268"/>
             <a:ext cx="2075321" cy="381108"/>
           </a:xfrm>
           <a:prstGeom prst="rect">
@@ -10250,7 +10259,7 @@
               <a:defRPr/>
             </a:pPr>
             <a:r>
-              <a:rPr kumimoji="0" lang="fr-FR" sz="1500" b="0" i="0" u="none" strike="noStrike" kern="1200" cap="none" spc="0" normalizeH="0" baseline="0" noProof="0">
+              <a:rPr kumimoji="0" lang="fr-FR" sz="1500" b="0" i="0" u="none" strike="noStrike" kern="1200" cap="none" spc="0" normalizeH="0" baseline="0" noProof="0" dirty="0">
                 <a:ln>
                   <a:noFill/>
                 </a:ln>
@@ -10264,22 +10273,8 @@
                 <a:ea typeface="+mn-ea"/>
                 <a:cs typeface="+mn-cs"/>
               </a:rPr>
-              <a:t>For-implementation</a:t>
-            </a:r>
-            <a:endParaRPr kumimoji="0" lang="fr-FR" sz="1500" b="0" i="0" u="none" strike="noStrike" kern="1200" cap="none" spc="0" normalizeH="0" baseline="0" noProof="0" dirty="0">
-              <a:ln>
-                <a:noFill/>
-              </a:ln>
-              <a:solidFill>
-                <a:prstClr val="black"/>
-              </a:solidFill>
-              <a:effectLst/>
-              <a:uLnTx/>
-              <a:uFillTx/>
-              <a:latin typeface="Arial"/>
-              <a:ea typeface="+mn-ea"/>
-              <a:cs typeface="+mn-cs"/>
-            </a:endParaRPr>
+              <a:t>Trial-implementation</a:t>
+            </a:r>
           </a:p>
         </p:txBody>
       </p:sp>
@@ -10297,7 +10292,7 @@
         </p:nvSpPr>
         <p:spPr>
           <a:xfrm>
-            <a:off x="6231816" y="6126603"/>
+            <a:off x="6619442" y="6126603"/>
             <a:ext cx="1702905" cy="381108"/>
           </a:xfrm>
           <a:prstGeom prst="rect">
@@ -10375,7 +10370,7 @@
         </p:nvSpPr>
         <p:spPr>
           <a:xfrm>
-            <a:off x="7212650" y="6588807"/>
+            <a:off x="7600276" y="6588807"/>
             <a:ext cx="0" cy="0"/>
           </a:xfrm>
           <a:prstGeom prst="rect">
@@ -10437,7 +10432,7 @@
         </p:nvSpPr>
         <p:spPr>
           <a:xfrm>
-            <a:off x="7052153" y="3594970"/>
+            <a:off x="7439779" y="3594970"/>
             <a:ext cx="0" cy="0"/>
           </a:xfrm>
           <a:prstGeom prst="rect">
@@ -10474,7 +10469,7 @@
         </p:nvSpPr>
         <p:spPr>
           <a:xfrm>
-            <a:off x="7057831" y="3347845"/>
+            <a:off x="7445457" y="3347845"/>
             <a:ext cx="2170038" cy="381108"/>
           </a:xfrm>
           <a:prstGeom prst="rect">
@@ -10552,7 +10547,7 @@
         </p:nvSpPr>
         <p:spPr>
           <a:xfrm>
-            <a:off x="6231816" y="4290681"/>
+            <a:off x="6619442" y="4290681"/>
             <a:ext cx="4214813" cy="1717000"/>
           </a:xfrm>
           <a:prstGeom prst="rect">
@@ -10685,7 +10680,7 @@
                 </a:solidFill>
                 <a:latin typeface="Arial"/>
               </a:rPr>
-              <a:t>Rester à « final-text « ou</a:t>
+              <a:t>Rester à « final-text » ou</a:t>
             </a:r>
           </a:p>
           <a:p>
@@ -10713,7 +10708,7 @@
                 </a:solidFill>
                 <a:latin typeface="Arial"/>
               </a:rPr>
-              <a:t>Retour à « pour implementation » si modification majeure</a:t>
+              <a:t>Retour à « trial-implementation » si modification majeure</a:t>
             </a:r>
           </a:p>
           <a:p>
@@ -10782,7 +10777,7 @@
                 <a:ea typeface="+mn-ea"/>
                 <a:cs typeface="+mn-cs"/>
               </a:rPr>
-              <a:t>Si statut précédent à « pour implémentation » </a:t>
+              <a:t>Si statut précédent à « trial-implementation » </a:t>
             </a:r>
           </a:p>
           <a:p>
@@ -10804,7 +10799,7 @@
               <a:defRPr/>
             </a:pPr>
             <a:r>
-              <a:rPr lang="fr-FR" sz="1200" b="1" dirty="0">
+              <a:rPr lang="fr-FR" sz="1200" dirty="0">
                 <a:solidFill>
                   <a:prstClr val="black"/>
                 </a:solidFill>
@@ -10827,7 +10822,33 @@
                 <a:ea typeface="+mn-ea"/>
                 <a:cs typeface="+mn-cs"/>
               </a:rPr>
-              <a:t>ester à « pour implémentation » ou </a:t>
+              <a:t>ester à « t</a:t>
+            </a:r>
+            <a:r>
+              <a:rPr lang="fr-FR" sz="1200" dirty="0">
+                <a:solidFill>
+                  <a:prstClr val="black"/>
+                </a:solidFill>
+                <a:latin typeface="Arial"/>
+              </a:rPr>
+              <a:t>rial-</a:t>
+            </a:r>
+            <a:r>
+              <a:rPr kumimoji="0" lang="fr-FR" sz="1200" i="0" u="none" strike="noStrike" kern="1200" cap="none" spc="0" normalizeH="0" baseline="0" noProof="0" dirty="0">
+                <a:ln>
+                  <a:noFill/>
+                </a:ln>
+                <a:solidFill>
+                  <a:prstClr val="black"/>
+                </a:solidFill>
+                <a:effectLst/>
+                <a:uLnTx/>
+                <a:uFillTx/>
+                <a:latin typeface="Arial"/>
+                <a:ea typeface="+mn-ea"/>
+                <a:cs typeface="+mn-cs"/>
+              </a:rPr>
+              <a:t>implementation » ou </a:t>
             </a:r>
           </a:p>
           <a:p>
@@ -10914,7 +10935,7 @@
         </p:nvSpPr>
         <p:spPr>
           <a:xfrm>
-            <a:off x="8137321" y="2516697"/>
+            <a:off x="8524947" y="2516697"/>
             <a:ext cx="0" cy="0"/>
           </a:xfrm>
           <a:prstGeom prst="rect">
@@ -10951,7 +10972,7 @@
         </p:nvSpPr>
         <p:spPr>
           <a:xfrm>
-            <a:off x="4792451" y="3283444"/>
+            <a:off x="5180077" y="3283444"/>
             <a:ext cx="824066" cy="381108"/>
           </a:xfrm>
           <a:prstGeom prst="rect">
@@ -11029,7 +11050,7 @@
         </p:nvSpPr>
         <p:spPr>
           <a:xfrm>
-            <a:off x="7057831" y="2448513"/>
+            <a:off x="7445457" y="2448513"/>
             <a:ext cx="2920511" cy="849288"/>
           </a:xfrm>
           <a:prstGeom prst="rect">
@@ -11144,7 +11165,7 @@
         </p:blipFill>
         <p:spPr>
           <a:xfrm>
-            <a:off x="5600673" y="2813102"/>
+            <a:off x="5988299" y="2813102"/>
             <a:ext cx="1702899" cy="1702899"/>
           </a:xfrm>
           <a:prstGeom prst="rect">

</xml_diff>